<commit_message>
updated slides, readme with ERD image
</commit_message>
<xml_diff>
--- a/U_of_A Final Project.pptx
+++ b/U_of_A Final Project.pptx
@@ -5,34 +5,35 @@
     <p:sldMasterId id="2147483659" r:id="rId1"/>
   </p:sldMasterIdLst>
   <p:notesMasterIdLst>
-    <p:notesMasterId r:id="rId6"/>
+    <p:notesMasterId r:id="rId7"/>
   </p:notesMasterIdLst>
   <p:sldIdLst>
     <p:sldId id="256" r:id="rId2"/>
     <p:sldId id="257" r:id="rId3"/>
     <p:sldId id="258" r:id="rId4"/>
-    <p:sldId id="259" r:id="rId5"/>
+    <p:sldId id="260" r:id="rId5"/>
+    <p:sldId id="259" r:id="rId6"/>
   </p:sldIdLst>
   <p:sldSz cx="9144000" cy="5143500" type="screen16x9"/>
   <p:notesSz cx="6858000" cy="9144000"/>
   <p:embeddedFontLst>
     <p:embeddedFont>
       <p:font typeface="Calibri" panose="020F0502020204030204" pitchFamily="34" charset="0"/>
-      <p:regular r:id="rId7"/>
-      <p:bold r:id="rId8"/>
-      <p:italic r:id="rId9"/>
-      <p:boldItalic r:id="rId10"/>
+      <p:regular r:id="rId8"/>
+      <p:bold r:id="rId9"/>
+      <p:italic r:id="rId10"/>
+      <p:boldItalic r:id="rId11"/>
     </p:embeddedFont>
     <p:embeddedFont>
       <p:font typeface="Lucida Console" panose="020B0609040504020204" pitchFamily="49" charset="0"/>
-      <p:regular r:id="rId11"/>
+      <p:regular r:id="rId12"/>
     </p:embeddedFont>
     <p:embeddedFont>
       <p:font typeface="Nunito" pitchFamily="2" charset="0"/>
-      <p:regular r:id="rId12"/>
-      <p:bold r:id="rId13"/>
-      <p:italic r:id="rId14"/>
-      <p:boldItalic r:id="rId15"/>
+      <p:regular r:id="rId13"/>
+      <p:bold r:id="rId14"/>
+      <p:italic r:id="rId15"/>
+      <p:boldItalic r:id="rId16"/>
     </p:embeddedFont>
   </p:embeddedFontLst>
   <p:defaultTextStyle>
@@ -9832,8 +9833,100 @@
           <a:p>
             <a:r>
               <a:rPr lang="en-US" sz="1050" i="1" dirty="0"/>
-              <a:t>(combined data city data for jobs and demographic)</a:t>
+              <a:t>(combined city data for jobs and demographic)</a:t>
             </a:r>
+          </a:p>
+        </p:txBody>
+      </p:sp>
+      <p:sp>
+        <p:nvSpPr>
+          <p:cNvPr id="3" name="Arrow: Right 2">
+            <a:extLst>
+              <a:ext uri="{FF2B5EF4-FFF2-40B4-BE49-F238E27FC236}">
+                <a16:creationId xmlns:a16="http://schemas.microsoft.com/office/drawing/2014/main" id="{F31D49A8-9043-47F9-8861-AFB520CFC1E3}"/>
+              </a:ext>
+            </a:extLst>
+          </p:cNvPr>
+          <p:cNvSpPr/>
+          <p:nvPr/>
+        </p:nvSpPr>
+        <p:spPr>
+          <a:xfrm>
+            <a:off x="3570013" y="3726174"/>
+            <a:ext cx="171879" cy="233757"/>
+          </a:xfrm>
+          <a:prstGeom prst="rightArrow">
+            <a:avLst/>
+          </a:prstGeom>
+        </p:spPr>
+        <p:style>
+          <a:lnRef idx="2">
+            <a:schemeClr val="accent1">
+              <a:shade val="50000"/>
+            </a:schemeClr>
+          </a:lnRef>
+          <a:fillRef idx="1">
+            <a:schemeClr val="accent1"/>
+          </a:fillRef>
+          <a:effectRef idx="0">
+            <a:schemeClr val="accent1"/>
+          </a:effectRef>
+          <a:fontRef idx="minor">
+            <a:schemeClr val="lt1"/>
+          </a:fontRef>
+        </p:style>
+        <p:txBody>
+          <a:bodyPr rtlCol="0" anchor="ctr"/>
+          <a:lstStyle/>
+          <a:p>
+            <a:pPr algn="ctr"/>
+            <a:endParaRPr lang="en-US"/>
+          </a:p>
+        </p:txBody>
+      </p:sp>
+      <p:sp>
+        <p:nvSpPr>
+          <p:cNvPr id="8" name="Arrow: Right 7">
+            <a:extLst>
+              <a:ext uri="{FF2B5EF4-FFF2-40B4-BE49-F238E27FC236}">
+                <a16:creationId xmlns:a16="http://schemas.microsoft.com/office/drawing/2014/main" id="{0C6AB154-D1D4-4981-8E68-29E4FF597E41}"/>
+              </a:ext>
+            </a:extLst>
+          </p:cNvPr>
+          <p:cNvSpPr/>
+          <p:nvPr/>
+        </p:nvSpPr>
+        <p:spPr>
+          <a:xfrm>
+            <a:off x="5850426" y="3726173"/>
+            <a:ext cx="171879" cy="233757"/>
+          </a:xfrm>
+          <a:prstGeom prst="rightArrow">
+            <a:avLst/>
+          </a:prstGeom>
+        </p:spPr>
+        <p:style>
+          <a:lnRef idx="2">
+            <a:schemeClr val="accent1">
+              <a:shade val="50000"/>
+            </a:schemeClr>
+          </a:lnRef>
+          <a:fillRef idx="1">
+            <a:schemeClr val="accent1"/>
+          </a:fillRef>
+          <a:effectRef idx="0">
+            <a:schemeClr val="accent1"/>
+          </a:effectRef>
+          <a:fontRef idx="minor">
+            <a:schemeClr val="lt1"/>
+          </a:fontRef>
+        </p:style>
+        <p:txBody>
+          <a:bodyPr rtlCol="0" anchor="ctr"/>
+          <a:lstStyle/>
+          <a:p>
+            <a:pPr algn="ctr"/>
+            <a:endParaRPr lang="en-US"/>
           </a:p>
         </p:txBody>
       </p:sp>
@@ -9846,6 +9939,99 @@
 </file>
 
 <file path=ppt/slides/slide4.xml><?xml version="1.0" encoding="utf-8"?>
+<p:sld xmlns:a="http://schemas.openxmlformats.org/drawingml/2006/main" xmlns:r="http://schemas.openxmlformats.org/officeDocument/2006/relationships" xmlns:p="http://schemas.openxmlformats.org/presentationml/2006/main">
+  <p:cSld>
+    <p:spTree>
+      <p:nvGrpSpPr>
+        <p:cNvPr id="1" name=""/>
+        <p:cNvGrpSpPr/>
+        <p:nvPr/>
+      </p:nvGrpSpPr>
+      <p:grpSpPr>
+        <a:xfrm>
+          <a:off x="0" y="0"/>
+          <a:ext cx="0" cy="0"/>
+          <a:chOff x="0" y="0"/>
+          <a:chExt cx="0" cy="0"/>
+        </a:xfrm>
+      </p:grpSpPr>
+      <p:sp>
+        <p:nvSpPr>
+          <p:cNvPr id="2" name="Title 1">
+            <a:extLst>
+              <a:ext uri="{FF2B5EF4-FFF2-40B4-BE49-F238E27FC236}">
+                <a16:creationId xmlns:a16="http://schemas.microsoft.com/office/drawing/2014/main" id="{BA72A6D4-FB7B-4CCC-97BB-2458F1565F9B}"/>
+              </a:ext>
+            </a:extLst>
+          </p:cNvPr>
+          <p:cNvSpPr>
+            <a:spLocks noGrp="1"/>
+          </p:cNvSpPr>
+          <p:nvPr>
+            <p:ph type="title"/>
+          </p:nvPr>
+        </p:nvSpPr>
+        <p:spPr>
+          <a:xfrm>
+            <a:off x="819150" y="281834"/>
+            <a:ext cx="7505700" cy="954600"/>
+          </a:xfrm>
+        </p:spPr>
+        <p:txBody>
+          <a:bodyPr/>
+          <a:lstStyle/>
+          <a:p>
+            <a:r>
+              <a:rPr lang="en-US" dirty="0"/>
+              <a:t>Database</a:t>
+            </a:r>
+          </a:p>
+        </p:txBody>
+      </p:sp>
+      <p:pic>
+        <p:nvPicPr>
+          <p:cNvPr id="7" name="Picture 6">
+            <a:extLst>
+              <a:ext uri="{FF2B5EF4-FFF2-40B4-BE49-F238E27FC236}">
+                <a16:creationId xmlns:a16="http://schemas.microsoft.com/office/drawing/2014/main" id="{1B21AFA5-9A18-4A63-B254-41D3338E6718}"/>
+              </a:ext>
+            </a:extLst>
+          </p:cNvPr>
+          <p:cNvPicPr>
+            <a:picLocks noChangeAspect="1"/>
+          </p:cNvPicPr>
+          <p:nvPr/>
+        </p:nvPicPr>
+        <p:blipFill>
+          <a:blip r:embed="rId2"/>
+          <a:stretch>
+            <a:fillRect/>
+          </a:stretch>
+        </p:blipFill>
+        <p:spPr>
+          <a:xfrm>
+            <a:off x="3953234" y="330009"/>
+            <a:ext cx="4715450" cy="2606604"/>
+          </a:xfrm>
+          <a:prstGeom prst="rect">
+            <a:avLst/>
+          </a:prstGeom>
+        </p:spPr>
+      </p:pic>
+    </p:spTree>
+    <p:extLst>
+      <p:ext uri="{BB962C8B-B14F-4D97-AF65-F5344CB8AC3E}">
+        <p14:creationId xmlns:p14="http://schemas.microsoft.com/office/powerpoint/2010/main" val="1040300106"/>
+      </p:ext>
+    </p:extLst>
+  </p:cSld>
+  <p:clrMapOvr>
+    <a:masterClrMapping/>
+  </p:clrMapOvr>
+</p:sld>
+</file>
+
+<file path=ppt/slides/slide5.xml><?xml version="1.0" encoding="utf-8"?>
 <p:sld xmlns:a="http://schemas.openxmlformats.org/drawingml/2006/main" xmlns:r="http://schemas.openxmlformats.org/officeDocument/2006/relationships" xmlns:p="http://schemas.openxmlformats.org/presentationml/2006/main">
   <p:cSld>
     <p:spTree>

</xml_diff>

<commit_message>
added charts to analysis.html
</commit_message>
<xml_diff>
--- a/U_of_A Final Project.pptx
+++ b/U_of_A Final Project.pptx
@@ -5,35 +5,34 @@
     <p:sldMasterId id="2147483659" r:id="rId1"/>
   </p:sldMasterIdLst>
   <p:notesMasterIdLst>
-    <p:notesMasterId r:id="rId7"/>
+    <p:notesMasterId r:id="rId6"/>
   </p:notesMasterIdLst>
   <p:sldIdLst>
     <p:sldId id="256" r:id="rId2"/>
     <p:sldId id="257" r:id="rId3"/>
     <p:sldId id="258" r:id="rId4"/>
-    <p:sldId id="260" r:id="rId5"/>
-    <p:sldId id="259" r:id="rId6"/>
+    <p:sldId id="259" r:id="rId5"/>
   </p:sldIdLst>
   <p:sldSz cx="9144000" cy="5143500" type="screen16x9"/>
   <p:notesSz cx="6858000" cy="9144000"/>
   <p:embeddedFontLst>
     <p:embeddedFont>
       <p:font typeface="Calibri" panose="020F0502020204030204" pitchFamily="34" charset="0"/>
-      <p:regular r:id="rId8"/>
-      <p:bold r:id="rId9"/>
-      <p:italic r:id="rId10"/>
-      <p:boldItalic r:id="rId11"/>
+      <p:regular r:id="rId7"/>
+      <p:bold r:id="rId8"/>
+      <p:italic r:id="rId9"/>
+      <p:boldItalic r:id="rId10"/>
     </p:embeddedFont>
     <p:embeddedFont>
       <p:font typeface="Lucida Console" panose="020B0609040504020204" pitchFamily="49" charset="0"/>
-      <p:regular r:id="rId12"/>
+      <p:regular r:id="rId11"/>
     </p:embeddedFont>
     <p:embeddedFont>
       <p:font typeface="Nunito" pitchFamily="2" charset="0"/>
-      <p:regular r:id="rId13"/>
-      <p:bold r:id="rId14"/>
-      <p:italic r:id="rId15"/>
-      <p:boldItalic r:id="rId16"/>
+      <p:regular r:id="rId12"/>
+      <p:bold r:id="rId13"/>
+      <p:italic r:id="rId14"/>
+      <p:boldItalic r:id="rId15"/>
     </p:embeddedFont>
   </p:embeddedFontLst>
   <p:defaultTextStyle>
@@ -9496,8 +9495,8 @@
         </p:nvSpPr>
         <p:spPr>
           <a:xfrm>
-            <a:off x="819150" y="1010652"/>
-            <a:ext cx="7505700" cy="3015561"/>
+            <a:off x="508765" y="1010652"/>
+            <a:ext cx="2480940" cy="3015561"/>
           </a:xfrm>
           <a:prstGeom prst="rect">
             <a:avLst/>
@@ -9528,72 +9527,13 @@
               <a:rPr lang="en-US" sz="1800" dirty="0">
                 <a:latin typeface="+mn-lt"/>
               </a:rPr>
-              <a:t> and contains three tables</a:t>
+              <a:t> DB and contains 5 tables</a:t>
             </a:r>
           </a:p>
           <a:p>
-            <a:r>
-              <a:rPr lang="en-US" sz="1400" dirty="0">
-                <a:latin typeface="+mn-lt"/>
-              </a:rPr>
-              <a:t>Table.bls50metro contains job data from US metro areas from the bureau of labor statistics </a:t>
-            </a:r>
-            <a:r>
-              <a:rPr lang="en-US" sz="1400" b="0" i="0" u="none" strike="noStrike" dirty="0">
-                <a:effectLst/>
-                <a:latin typeface="+mn-lt"/>
-                <a:hlinkClick r:id="rId3"/>
-              </a:rPr>
-              <a:t>https://www.bls.gov/oes/tables.htm</a:t>
-            </a:r>
-            <a:endParaRPr lang="en-US" sz="1400" b="0" i="0" u="none" strike="noStrike" dirty="0">
-              <a:effectLst/>
+            <a:endParaRPr lang="en-US" sz="1800" dirty="0">
               <a:latin typeface="+mn-lt"/>
             </a:endParaRPr>
-          </a:p>
-          <a:p>
-            <a:r>
-              <a:rPr lang="en-US" sz="1400" dirty="0" err="1">
-                <a:latin typeface="+mn-lt"/>
-              </a:rPr>
-              <a:t>Table.democity</a:t>
-            </a:r>
-            <a:r>
-              <a:rPr lang="en-US" sz="1400" dirty="0">
-                <a:latin typeface="+mn-lt"/>
-              </a:rPr>
-              <a:t> contains demographic data of all the cities in the jobs table from </a:t>
-            </a:r>
-            <a:r>
-              <a:rPr lang="en-US" sz="1400" dirty="0">
-                <a:latin typeface="+mn-lt"/>
-                <a:hlinkClick r:id="rId4">
-                  <a:extLst>
-                    <a:ext uri="{A12FA001-AC4F-418D-AE19-62706E023703}">
-                      <ahyp:hlinkClr xmlns:ahyp="http://schemas.microsoft.com/office/drawing/2018/hyperlinkcolor" val="tx"/>
-                    </a:ext>
-                  </a:extLst>
-                </a:hlinkClick>
-              </a:rPr>
-              <a:t>https://www.cubitplanning.com</a:t>
-            </a:r>
-            <a:endParaRPr lang="en-US" sz="1400" dirty="0">
-              <a:latin typeface="+mn-lt"/>
-            </a:endParaRPr>
-          </a:p>
-          <a:p>
-            <a:r>
-              <a:rPr lang="en-US" sz="1400" dirty="0" err="1">
-                <a:latin typeface="+mn-lt"/>
-              </a:rPr>
-              <a:t>Table.jobsdemo</a:t>
-            </a:r>
-            <a:r>
-              <a:rPr lang="en-US" sz="1400" dirty="0">
-                <a:latin typeface="+mn-lt"/>
-              </a:rPr>
-              <a:t> contains data for the machine learning algorithm of US metro area jobs and their demographic data.   </a:t>
-            </a:r>
           </a:p>
           <a:p>
             <a:pPr marL="0" indent="0">
@@ -9620,316 +9560,36 @@
           </a:p>
         </p:txBody>
       </p:sp>
-      <p:sp>
-        <p:nvSpPr>
-          <p:cNvPr id="2" name="Rectangle: Rounded Corners 1">
+      <p:pic>
+        <p:nvPicPr>
+          <p:cNvPr id="9" name="Picture 8" descr="A picture containing graphical user interface&#10;&#10;Description automatically generated">
             <a:extLst>
               <a:ext uri="{FF2B5EF4-FFF2-40B4-BE49-F238E27FC236}">
-                <a16:creationId xmlns:a16="http://schemas.microsoft.com/office/drawing/2014/main" id="{2FFD9D86-2B06-48C6-82CA-5CE4B596DB5E}"/>
+                <a16:creationId xmlns:a16="http://schemas.microsoft.com/office/drawing/2014/main" id="{5B86EF78-DB76-4008-B2AA-2BF10DF0C746}"/>
               </a:ext>
             </a:extLst>
           </p:cNvPr>
-          <p:cNvSpPr/>
+          <p:cNvPicPr>
+            <a:picLocks noChangeAspect="1"/>
+          </p:cNvPicPr>
           <p:nvPr/>
-        </p:nvSpPr>
+        </p:nvPicPr>
+        <p:blipFill>
+          <a:blip r:embed="rId3"/>
+          <a:stretch>
+            <a:fillRect/>
+          </a:stretch>
+        </p:blipFill>
         <p:spPr>
           <a:xfrm>
-            <a:off x="1581293" y="3303351"/>
-            <a:ext cx="1904427" cy="1079404"/>
+            <a:off x="3300090" y="988886"/>
+            <a:ext cx="5335145" cy="2835678"/>
           </a:xfrm>
-          <a:prstGeom prst="roundRect">
+          <a:prstGeom prst="rect">
             <a:avLst/>
           </a:prstGeom>
         </p:spPr>
-        <p:style>
-          <a:lnRef idx="2">
-            <a:schemeClr val="dk1">
-              <a:shade val="50000"/>
-            </a:schemeClr>
-          </a:lnRef>
-          <a:fillRef idx="1">
-            <a:schemeClr val="dk1"/>
-          </a:fillRef>
-          <a:effectRef idx="0">
-            <a:schemeClr val="dk1"/>
-          </a:effectRef>
-          <a:fontRef idx="minor">
-            <a:schemeClr val="lt1"/>
-          </a:fontRef>
-        </p:style>
-        <p:txBody>
-          <a:bodyPr rtlCol="0" anchor="ctr"/>
-          <a:lstStyle/>
-          <a:p>
-            <a:pPr algn="ctr"/>
-            <a:r>
-              <a:rPr lang="en-US" dirty="0"/>
-              <a:t>Bls50metro</a:t>
-            </a:r>
-          </a:p>
-          <a:p>
-            <a:r>
-              <a:rPr lang="en-US" sz="1100" dirty="0"/>
-              <a:t>Primary Key = Index</a:t>
-            </a:r>
-          </a:p>
-          <a:p>
-            <a:r>
-              <a:rPr lang="en-US" sz="1100" dirty="0"/>
-              <a:t>Foreign Key = </a:t>
-            </a:r>
-            <a:r>
-              <a:rPr lang="en-US" sz="1100" dirty="0" err="1"/>
-              <a:t>area_title</a:t>
-            </a:r>
-            <a:endParaRPr lang="en-US" sz="1100" dirty="0"/>
-          </a:p>
-          <a:p>
-            <a:r>
-              <a:rPr lang="en-US" sz="1100" i="1" dirty="0"/>
-              <a:t>(Jobs information, total employment, jobs per 1000)</a:t>
-            </a:r>
-          </a:p>
-        </p:txBody>
-      </p:sp>
-      <p:sp>
-        <p:nvSpPr>
-          <p:cNvPr id="5" name="Rectangle: Rounded Corners 4">
-            <a:extLst>
-              <a:ext uri="{FF2B5EF4-FFF2-40B4-BE49-F238E27FC236}">
-                <a16:creationId xmlns:a16="http://schemas.microsoft.com/office/drawing/2014/main" id="{119C8B9F-CE75-4C18-AA02-0E0717FAE8D8}"/>
-              </a:ext>
-            </a:extLst>
-          </p:cNvPr>
-          <p:cNvSpPr/>
-          <p:nvPr/>
-        </p:nvSpPr>
-        <p:spPr>
-          <a:xfrm>
-            <a:off x="3830625" y="3303351"/>
-            <a:ext cx="1904427" cy="1079404"/>
-          </a:xfrm>
-          <a:prstGeom prst="roundRect">
-            <a:avLst/>
-          </a:prstGeom>
-        </p:spPr>
-        <p:style>
-          <a:lnRef idx="2">
-            <a:schemeClr val="dk1">
-              <a:shade val="50000"/>
-            </a:schemeClr>
-          </a:lnRef>
-          <a:fillRef idx="1">
-            <a:schemeClr val="dk1"/>
-          </a:fillRef>
-          <a:effectRef idx="0">
-            <a:schemeClr val="dk1"/>
-          </a:effectRef>
-          <a:fontRef idx="minor">
-            <a:schemeClr val="lt1"/>
-          </a:fontRef>
-        </p:style>
-        <p:txBody>
-          <a:bodyPr rtlCol="0" anchor="ctr"/>
-          <a:lstStyle/>
-          <a:p>
-            <a:pPr algn="ctr"/>
-            <a:r>
-              <a:rPr lang="en-US" dirty="0" err="1"/>
-              <a:t>democity</a:t>
-            </a:r>
-            <a:endParaRPr lang="en-US" dirty="0"/>
-          </a:p>
-          <a:p>
-            <a:r>
-              <a:rPr lang="en-US" sz="1100" dirty="0"/>
-              <a:t>Primary Key = Index</a:t>
-            </a:r>
-          </a:p>
-          <a:p>
-            <a:r>
-              <a:rPr lang="en-US" sz="1100" dirty="0"/>
-              <a:t>Foreign Key = </a:t>
-            </a:r>
-            <a:r>
-              <a:rPr lang="en-US" sz="1100" dirty="0" err="1"/>
-              <a:t>area_title</a:t>
-            </a:r>
-            <a:endParaRPr lang="en-US" sz="1100" dirty="0"/>
-          </a:p>
-          <a:p>
-            <a:r>
-              <a:rPr lang="en-US" sz="1100" i="1" dirty="0"/>
-              <a:t>(city demographic data, population, race, gender)</a:t>
-            </a:r>
-          </a:p>
-        </p:txBody>
-      </p:sp>
-      <p:sp>
-        <p:nvSpPr>
-          <p:cNvPr id="6" name="Rectangle: Rounded Corners 5">
-            <a:extLst>
-              <a:ext uri="{FF2B5EF4-FFF2-40B4-BE49-F238E27FC236}">
-                <a16:creationId xmlns:a16="http://schemas.microsoft.com/office/drawing/2014/main" id="{2D5E578B-932A-45C9-BD10-387AED173C6C}"/>
-              </a:ext>
-            </a:extLst>
-          </p:cNvPr>
-          <p:cNvSpPr/>
-          <p:nvPr/>
-        </p:nvSpPr>
-        <p:spPr>
-          <a:xfrm>
-            <a:off x="6079957" y="3303351"/>
-            <a:ext cx="1904427" cy="1079404"/>
-          </a:xfrm>
-          <a:prstGeom prst="roundRect">
-            <a:avLst/>
-          </a:prstGeom>
-        </p:spPr>
-        <p:style>
-          <a:lnRef idx="2">
-            <a:schemeClr val="dk1">
-              <a:shade val="50000"/>
-            </a:schemeClr>
-          </a:lnRef>
-          <a:fillRef idx="1">
-            <a:schemeClr val="dk1"/>
-          </a:fillRef>
-          <a:effectRef idx="0">
-            <a:schemeClr val="dk1"/>
-          </a:effectRef>
-          <a:fontRef idx="minor">
-            <a:schemeClr val="lt1"/>
-          </a:fontRef>
-        </p:style>
-        <p:txBody>
-          <a:bodyPr rtlCol="0" anchor="ctr"/>
-          <a:lstStyle/>
-          <a:p>
-            <a:pPr algn="ctr"/>
-            <a:r>
-              <a:rPr lang="en-US" dirty="0" err="1"/>
-              <a:t>jobsdemo</a:t>
-            </a:r>
-            <a:endParaRPr lang="en-US" dirty="0"/>
-          </a:p>
-          <a:p>
-            <a:r>
-              <a:rPr lang="en-US" sz="1100" dirty="0"/>
-              <a:t>Primary Key = Index</a:t>
-            </a:r>
-          </a:p>
-          <a:p>
-            <a:r>
-              <a:rPr lang="en-US" sz="1100" dirty="0"/>
-              <a:t>Foreign Key = </a:t>
-            </a:r>
-            <a:r>
-              <a:rPr lang="en-US" sz="1100" dirty="0" err="1"/>
-              <a:t>area_title</a:t>
-            </a:r>
-            <a:endParaRPr lang="en-US" sz="1100" dirty="0"/>
-          </a:p>
-          <a:p>
-            <a:r>
-              <a:rPr lang="en-US" sz="1050" i="1" dirty="0"/>
-              <a:t>(combined city data for jobs and demographic)</a:t>
-            </a:r>
-          </a:p>
-        </p:txBody>
-      </p:sp>
-      <p:sp>
-        <p:nvSpPr>
-          <p:cNvPr id="3" name="Arrow: Right 2">
-            <a:extLst>
-              <a:ext uri="{FF2B5EF4-FFF2-40B4-BE49-F238E27FC236}">
-                <a16:creationId xmlns:a16="http://schemas.microsoft.com/office/drawing/2014/main" id="{F31D49A8-9043-47F9-8861-AFB520CFC1E3}"/>
-              </a:ext>
-            </a:extLst>
-          </p:cNvPr>
-          <p:cNvSpPr/>
-          <p:nvPr/>
-        </p:nvSpPr>
-        <p:spPr>
-          <a:xfrm>
-            <a:off x="3570013" y="3726174"/>
-            <a:ext cx="171879" cy="233757"/>
-          </a:xfrm>
-          <a:prstGeom prst="rightArrow">
-            <a:avLst/>
-          </a:prstGeom>
-        </p:spPr>
-        <p:style>
-          <a:lnRef idx="2">
-            <a:schemeClr val="accent1">
-              <a:shade val="50000"/>
-            </a:schemeClr>
-          </a:lnRef>
-          <a:fillRef idx="1">
-            <a:schemeClr val="accent1"/>
-          </a:fillRef>
-          <a:effectRef idx="0">
-            <a:schemeClr val="accent1"/>
-          </a:effectRef>
-          <a:fontRef idx="minor">
-            <a:schemeClr val="lt1"/>
-          </a:fontRef>
-        </p:style>
-        <p:txBody>
-          <a:bodyPr rtlCol="0" anchor="ctr"/>
-          <a:lstStyle/>
-          <a:p>
-            <a:pPr algn="ctr"/>
-            <a:endParaRPr lang="en-US"/>
-          </a:p>
-        </p:txBody>
-      </p:sp>
-      <p:sp>
-        <p:nvSpPr>
-          <p:cNvPr id="8" name="Arrow: Right 7">
-            <a:extLst>
-              <a:ext uri="{FF2B5EF4-FFF2-40B4-BE49-F238E27FC236}">
-                <a16:creationId xmlns:a16="http://schemas.microsoft.com/office/drawing/2014/main" id="{0C6AB154-D1D4-4981-8E68-29E4FF597E41}"/>
-              </a:ext>
-            </a:extLst>
-          </p:cNvPr>
-          <p:cNvSpPr/>
-          <p:nvPr/>
-        </p:nvSpPr>
-        <p:spPr>
-          <a:xfrm>
-            <a:off x="5850426" y="3726173"/>
-            <a:ext cx="171879" cy="233757"/>
-          </a:xfrm>
-          <a:prstGeom prst="rightArrow">
-            <a:avLst/>
-          </a:prstGeom>
-        </p:spPr>
-        <p:style>
-          <a:lnRef idx="2">
-            <a:schemeClr val="accent1">
-              <a:shade val="50000"/>
-            </a:schemeClr>
-          </a:lnRef>
-          <a:fillRef idx="1">
-            <a:schemeClr val="accent1"/>
-          </a:fillRef>
-          <a:effectRef idx="0">
-            <a:schemeClr val="accent1"/>
-          </a:effectRef>
-          <a:fontRef idx="minor">
-            <a:schemeClr val="lt1"/>
-          </a:fontRef>
-        </p:style>
-        <p:txBody>
-          <a:bodyPr rtlCol="0" anchor="ctr"/>
-          <a:lstStyle/>
-          <a:p>
-            <a:pPr algn="ctr"/>
-            <a:endParaRPr lang="en-US"/>
-          </a:p>
-        </p:txBody>
-      </p:sp>
+      </p:pic>
     </p:spTree>
   </p:cSld>
   <p:clrMapOvr>
@@ -9939,99 +9599,6 @@
 </file>
 
 <file path=ppt/slides/slide4.xml><?xml version="1.0" encoding="utf-8"?>
-<p:sld xmlns:a="http://schemas.openxmlformats.org/drawingml/2006/main" xmlns:r="http://schemas.openxmlformats.org/officeDocument/2006/relationships" xmlns:p="http://schemas.openxmlformats.org/presentationml/2006/main">
-  <p:cSld>
-    <p:spTree>
-      <p:nvGrpSpPr>
-        <p:cNvPr id="1" name=""/>
-        <p:cNvGrpSpPr/>
-        <p:nvPr/>
-      </p:nvGrpSpPr>
-      <p:grpSpPr>
-        <a:xfrm>
-          <a:off x="0" y="0"/>
-          <a:ext cx="0" cy="0"/>
-          <a:chOff x="0" y="0"/>
-          <a:chExt cx="0" cy="0"/>
-        </a:xfrm>
-      </p:grpSpPr>
-      <p:sp>
-        <p:nvSpPr>
-          <p:cNvPr id="2" name="Title 1">
-            <a:extLst>
-              <a:ext uri="{FF2B5EF4-FFF2-40B4-BE49-F238E27FC236}">
-                <a16:creationId xmlns:a16="http://schemas.microsoft.com/office/drawing/2014/main" id="{BA72A6D4-FB7B-4CCC-97BB-2458F1565F9B}"/>
-              </a:ext>
-            </a:extLst>
-          </p:cNvPr>
-          <p:cNvSpPr>
-            <a:spLocks noGrp="1"/>
-          </p:cNvSpPr>
-          <p:nvPr>
-            <p:ph type="title"/>
-          </p:nvPr>
-        </p:nvSpPr>
-        <p:spPr>
-          <a:xfrm>
-            <a:off x="819150" y="281834"/>
-            <a:ext cx="7505700" cy="954600"/>
-          </a:xfrm>
-        </p:spPr>
-        <p:txBody>
-          <a:bodyPr/>
-          <a:lstStyle/>
-          <a:p>
-            <a:r>
-              <a:rPr lang="en-US" dirty="0"/>
-              <a:t>Database</a:t>
-            </a:r>
-          </a:p>
-        </p:txBody>
-      </p:sp>
-      <p:pic>
-        <p:nvPicPr>
-          <p:cNvPr id="7" name="Picture 6">
-            <a:extLst>
-              <a:ext uri="{FF2B5EF4-FFF2-40B4-BE49-F238E27FC236}">
-                <a16:creationId xmlns:a16="http://schemas.microsoft.com/office/drawing/2014/main" id="{1B21AFA5-9A18-4A63-B254-41D3338E6718}"/>
-              </a:ext>
-            </a:extLst>
-          </p:cNvPr>
-          <p:cNvPicPr>
-            <a:picLocks noChangeAspect="1"/>
-          </p:cNvPicPr>
-          <p:nvPr/>
-        </p:nvPicPr>
-        <p:blipFill>
-          <a:blip r:embed="rId2"/>
-          <a:stretch>
-            <a:fillRect/>
-          </a:stretch>
-        </p:blipFill>
-        <p:spPr>
-          <a:xfrm>
-            <a:off x="3953234" y="330009"/>
-            <a:ext cx="4715450" cy="2606604"/>
-          </a:xfrm>
-          <a:prstGeom prst="rect">
-            <a:avLst/>
-          </a:prstGeom>
-        </p:spPr>
-      </p:pic>
-    </p:spTree>
-    <p:extLst>
-      <p:ext uri="{BB962C8B-B14F-4D97-AF65-F5344CB8AC3E}">
-        <p14:creationId xmlns:p14="http://schemas.microsoft.com/office/powerpoint/2010/main" val="1040300106"/>
-      </p:ext>
-    </p:extLst>
-  </p:cSld>
-  <p:clrMapOvr>
-    <a:masterClrMapping/>
-  </p:clrMapOvr>
-</p:sld>
-</file>
-
-<file path=ppt/slides/slide5.xml><?xml version="1.0" encoding="utf-8"?>
 <p:sld xmlns:a="http://schemas.openxmlformats.org/drawingml/2006/main" xmlns:r="http://schemas.openxmlformats.org/officeDocument/2006/relationships" xmlns:p="http://schemas.openxmlformats.org/presentationml/2006/main">
   <p:cSld>
     <p:spTree>

</xml_diff>